<commit_message>
Updates to the PPT flowcharts
</commit_message>
<xml_diff>
--- a/Documentation/Results/EDPM/Flowcharts.pptx
+++ b/Documentation/Results/EDPM/Flowcharts.pptx
@@ -7,8 +7,8 @@
   <p:sldIdLst>
     <p:sldId id="259" r:id="rId2"/>
     <p:sldId id="260" r:id="rId3"/>
-    <p:sldId id="261" r:id="rId4"/>
-    <p:sldId id="262" r:id="rId5"/>
+    <p:sldId id="262" r:id="rId4"/>
+    <p:sldId id="261" r:id="rId5"/>
   </p:sldIdLst>
   <p:sldSz cx="9144000" cy="6858000" type="screen4x3"/>
   <p:notesSz cx="6858000" cy="9144000"/>
@@ -291,7 +291,7 @@
           <a:p>
             <a:fld id="{7B943329-1151-9D43-96D9-FAE02A470F34}" type="datetimeFigureOut">
               <a:rPr lang="en-US" smtClean="0"/>
-              <a:t>8/25/14</a:t>
+              <a:t>8/26/2014</a:t>
             </a:fld>
             <a:endParaRPr lang="en-US"/>
           </a:p>
@@ -461,7 +461,7 @@
           <a:p>
             <a:fld id="{7B943329-1151-9D43-96D9-FAE02A470F34}" type="datetimeFigureOut">
               <a:rPr lang="en-US" smtClean="0"/>
-              <a:t>8/25/14</a:t>
+              <a:t>8/26/2014</a:t>
             </a:fld>
             <a:endParaRPr lang="en-US"/>
           </a:p>
@@ -641,7 +641,7 @@
           <a:p>
             <a:fld id="{7B943329-1151-9D43-96D9-FAE02A470F34}" type="datetimeFigureOut">
               <a:rPr lang="en-US" smtClean="0"/>
-              <a:t>8/25/14</a:t>
+              <a:t>8/26/2014</a:t>
             </a:fld>
             <a:endParaRPr lang="en-US"/>
           </a:p>
@@ -811,7 +811,7 @@
           <a:p>
             <a:fld id="{7B943329-1151-9D43-96D9-FAE02A470F34}" type="datetimeFigureOut">
               <a:rPr lang="en-US" smtClean="0"/>
-              <a:t>8/25/14</a:t>
+              <a:t>8/26/2014</a:t>
             </a:fld>
             <a:endParaRPr lang="en-US"/>
           </a:p>
@@ -1057,7 +1057,7 @@
           <a:p>
             <a:fld id="{7B943329-1151-9D43-96D9-FAE02A470F34}" type="datetimeFigureOut">
               <a:rPr lang="en-US" smtClean="0"/>
-              <a:t>8/25/14</a:t>
+              <a:t>8/26/2014</a:t>
             </a:fld>
             <a:endParaRPr lang="en-US"/>
           </a:p>
@@ -1345,7 +1345,7 @@
           <a:p>
             <a:fld id="{7B943329-1151-9D43-96D9-FAE02A470F34}" type="datetimeFigureOut">
               <a:rPr lang="en-US" smtClean="0"/>
-              <a:t>8/25/14</a:t>
+              <a:t>8/26/2014</a:t>
             </a:fld>
             <a:endParaRPr lang="en-US"/>
           </a:p>
@@ -1767,7 +1767,7 @@
           <a:p>
             <a:fld id="{7B943329-1151-9D43-96D9-FAE02A470F34}" type="datetimeFigureOut">
               <a:rPr lang="en-US" smtClean="0"/>
-              <a:t>8/25/14</a:t>
+              <a:t>8/26/2014</a:t>
             </a:fld>
             <a:endParaRPr lang="en-US"/>
           </a:p>
@@ -1885,7 +1885,7 @@
           <a:p>
             <a:fld id="{7B943329-1151-9D43-96D9-FAE02A470F34}" type="datetimeFigureOut">
               <a:rPr lang="en-US" smtClean="0"/>
-              <a:t>8/25/14</a:t>
+              <a:t>8/26/2014</a:t>
             </a:fld>
             <a:endParaRPr lang="en-US"/>
           </a:p>
@@ -1980,7 +1980,7 @@
           <a:p>
             <a:fld id="{7B943329-1151-9D43-96D9-FAE02A470F34}" type="datetimeFigureOut">
               <a:rPr lang="en-US" smtClean="0"/>
-              <a:t>8/25/14</a:t>
+              <a:t>8/26/2014</a:t>
             </a:fld>
             <a:endParaRPr lang="en-US"/>
           </a:p>
@@ -2257,7 +2257,7 @@
           <a:p>
             <a:fld id="{7B943329-1151-9D43-96D9-FAE02A470F34}" type="datetimeFigureOut">
               <a:rPr lang="en-US" smtClean="0"/>
-              <a:t>8/25/14</a:t>
+              <a:t>8/26/2014</a:t>
             </a:fld>
             <a:endParaRPr lang="en-US"/>
           </a:p>
@@ -2510,7 +2510,7 @@
           <a:p>
             <a:fld id="{7B943329-1151-9D43-96D9-FAE02A470F34}" type="datetimeFigureOut">
               <a:rPr lang="en-US" smtClean="0"/>
-              <a:t>8/25/14</a:t>
+              <a:t>8/26/2014</a:t>
             </a:fld>
             <a:endParaRPr lang="en-US"/>
           </a:p>
@@ -2723,7 +2723,7 @@
           <a:p>
             <a:fld id="{7B943329-1151-9D43-96D9-FAE02A470F34}" type="datetimeFigureOut">
               <a:rPr lang="en-US" smtClean="0"/>
-              <a:t>8/25/14</a:t>
+              <a:t>8/26/2014</a:t>
             </a:fld>
             <a:endParaRPr lang="en-US"/>
           </a:p>
@@ -3814,8 +3814,8 @@
         </p:nvSpPr>
         <p:spPr>
           <a:xfrm>
-            <a:off x="3733270" y="3213101"/>
-            <a:ext cx="1031876" cy="539750"/>
+            <a:off x="3566584" y="3213101"/>
+            <a:ext cx="1365250" cy="539750"/>
           </a:xfrm>
           <a:prstGeom prst="flowChartAlternateProcess">
             <a:avLst/>
@@ -3924,21 +3924,21 @@
       </p:cxnSp>
       <p:cxnSp>
         <p:nvCxnSpPr>
-          <p:cNvPr id="41" name="Curved Connector 40"/>
+          <p:cNvPr id="70" name="Curved Connector 69"/>
           <p:cNvCxnSpPr>
-            <a:stCxn id="5" idx="2"/>
-            <a:endCxn id="18" idx="0"/>
+            <a:stCxn id="7" idx="3"/>
+            <a:endCxn id="4" idx="3"/>
           </p:cNvCxnSpPr>
           <p:nvPr/>
         </p:nvCxnSpPr>
         <p:spPr>
-          <a:xfrm rot="16200000" flipH="1">
-            <a:off x="2416176" y="3094567"/>
-            <a:ext cx="230718" cy="6350"/>
+          <a:xfrm flipV="1">
+            <a:off x="4771497" y="1840441"/>
+            <a:ext cx="160336" cy="2443692"/>
           </a:xfrm>
           <a:prstGeom prst="curvedConnector3">
             <a:avLst>
-              <a:gd name="adj1" fmla="val 50000"/>
+              <a:gd name="adj1" fmla="val 242576"/>
             </a:avLst>
           </a:prstGeom>
           <a:ln>
@@ -3962,7 +3962,43 @@
       </p:cxnSp>
       <p:cxnSp>
         <p:nvCxnSpPr>
-          <p:cNvPr id="47" name="Straight Arrow Connector 46"/>
+          <p:cNvPr id="34" name="Curved Connector 33"/>
+          <p:cNvCxnSpPr>
+            <a:stCxn id="18" idx="2"/>
+            <a:endCxn id="7" idx="1"/>
+          </p:cNvCxnSpPr>
+          <p:nvPr/>
+        </p:nvCxnSpPr>
+        <p:spPr>
+          <a:xfrm rot="16200000" flipH="1">
+            <a:off x="2871524" y="3416036"/>
+            <a:ext cx="531282" cy="1204911"/>
+          </a:xfrm>
+          <a:prstGeom prst="curvedConnector2">
+            <a:avLst/>
+          </a:prstGeom>
+          <a:ln>
+            <a:tailEnd type="arrow"/>
+          </a:ln>
+        </p:spPr>
+        <p:style>
+          <a:lnRef idx="2">
+            <a:schemeClr val="dk1"/>
+          </a:lnRef>
+          <a:fillRef idx="1">
+            <a:schemeClr val="lt1"/>
+          </a:fillRef>
+          <a:effectRef idx="0">
+            <a:schemeClr val="dk1"/>
+          </a:effectRef>
+          <a:fontRef idx="minor">
+            <a:schemeClr val="dk1"/>
+          </a:fontRef>
+        </p:style>
+      </p:cxnSp>
+      <p:cxnSp>
+        <p:nvCxnSpPr>
+          <p:cNvPr id="44" name="Straight Arrow Connector 43"/>
           <p:cNvCxnSpPr>
             <a:stCxn id="18" idx="3"/>
             <a:endCxn id="21" idx="1"/>
@@ -3972,7 +4008,7 @@
         <p:spPr>
           <a:xfrm>
             <a:off x="3050648" y="3482976"/>
-            <a:ext cx="682622" cy="0"/>
+            <a:ext cx="515936" cy="0"/>
           </a:xfrm>
           <a:prstGeom prst="straightConnector1">
             <a:avLst/>
@@ -3999,60 +4035,20 @@
       </p:cxnSp>
       <p:cxnSp>
         <p:nvCxnSpPr>
-          <p:cNvPr id="67" name="Curved Connector 66"/>
+          <p:cNvPr id="46" name="Straight Arrow Connector 45"/>
           <p:cNvCxnSpPr>
-            <a:stCxn id="21" idx="2"/>
-            <a:endCxn id="7" idx="0"/>
+            <a:stCxn id="5" idx="2"/>
+            <a:endCxn id="18" idx="0"/>
           </p:cNvCxnSpPr>
           <p:nvPr/>
         </p:nvCxnSpPr>
         <p:spPr>
-          <a:xfrm rot="16200000" flipH="1">
-            <a:off x="4121680" y="3880378"/>
-            <a:ext cx="261407" cy="6351"/>
-          </a:xfrm>
-          <a:prstGeom prst="curvedConnector3">
-            <a:avLst>
-              <a:gd name="adj1" fmla="val 50000"/>
-            </a:avLst>
-          </a:prstGeom>
-          <a:ln>
-            <a:tailEnd type="arrow"/>
-          </a:ln>
-        </p:spPr>
-        <p:style>
-          <a:lnRef idx="2">
-            <a:schemeClr val="dk1"/>
-          </a:lnRef>
-          <a:fillRef idx="1">
-            <a:schemeClr val="lt1"/>
-          </a:fillRef>
-          <a:effectRef idx="0">
-            <a:schemeClr val="dk1"/>
-          </a:effectRef>
-          <a:fontRef idx="minor">
-            <a:schemeClr val="dk1"/>
-          </a:fontRef>
-        </p:style>
-      </p:cxnSp>
-      <p:cxnSp>
-        <p:nvCxnSpPr>
-          <p:cNvPr id="70" name="Curved Connector 69"/>
-          <p:cNvCxnSpPr>
-            <a:stCxn id="7" idx="3"/>
-            <a:endCxn id="4" idx="3"/>
-          </p:cNvCxnSpPr>
-          <p:nvPr/>
-        </p:nvCxnSpPr>
-        <p:spPr>
-          <a:xfrm flipV="1">
-            <a:off x="4771497" y="1840441"/>
-            <a:ext cx="160336" cy="2443692"/>
-          </a:xfrm>
-          <a:prstGeom prst="curvedConnector3">
-            <a:avLst>
-              <a:gd name="adj1" fmla="val 242576"/>
-            </a:avLst>
+          <a:xfrm>
+            <a:off x="2528360" y="2982383"/>
+            <a:ext cx="6350" cy="230718"/>
+          </a:xfrm>
+          <a:prstGeom prst="straightConnector1">
+            <a:avLst/>
           </a:prstGeom>
           <a:ln>
             <a:tailEnd type="arrow"/>
@@ -4083,6 +4079,13 @@
   <p:clrMapOvr>
     <a:masterClrMapping/>
   </p:clrMapOvr>
+  <p:timing>
+    <p:tnLst>
+      <p:par>
+        <p:cTn id="1" dur="indefinite" restart="never" nodeType="tmRoot"/>
+      </p:par>
+    </p:tnLst>
+  </p:timing>
 </p:sld>
 </file>
 
@@ -4181,7 +4184,7 @@
             <a:pPr algn="ctr"/>
             <a:r>
               <a:rPr lang="en-US" dirty="0" smtClean="0"/>
-              <a:t>Idle</a:t>
+              <a:t>Initialize</a:t>
             </a:r>
             <a:endParaRPr lang="en-US" dirty="0"/>
           </a:p>
@@ -4195,8 +4198,8 @@
         </p:nvSpPr>
         <p:spPr>
           <a:xfrm>
-            <a:off x="5127496" y="2394918"/>
-            <a:ext cx="1365250" cy="539750"/>
+            <a:off x="3810132" y="3218229"/>
+            <a:ext cx="878152" cy="539750"/>
           </a:xfrm>
           <a:prstGeom prst="flowChartAlternateProcess">
             <a:avLst/>
@@ -4223,7 +4226,7 @@
             <a:pPr algn="ctr"/>
             <a:r>
               <a:rPr lang="en-US" dirty="0" smtClean="0"/>
-              <a:t>Read</a:t>
+              <a:t>Poll</a:t>
             </a:r>
             <a:endParaRPr lang="en-US" dirty="0"/>
           </a:p>
@@ -4273,7 +4276,7 @@
         </p:nvSpPr>
         <p:spPr>
           <a:xfrm>
-            <a:off x="2040268" y="2387889"/>
+            <a:off x="3572934" y="2387889"/>
             <a:ext cx="1365250" cy="539750"/>
           </a:xfrm>
           <a:prstGeom prst="flowChartAlternateProcess">
@@ -4301,7 +4304,7 @@
             <a:pPr algn="ctr"/>
             <a:r>
               <a:rPr lang="en-US" dirty="0" smtClean="0"/>
-              <a:t>Command</a:t>
+              <a:t>Idle</a:t>
             </a:r>
             <a:endParaRPr lang="en-US" dirty="0"/>
           </a:p>
@@ -4315,7 +4318,7 @@
         </p:nvSpPr>
         <p:spPr>
           <a:xfrm>
-            <a:off x="3572934" y="2387889"/>
+            <a:off x="2001074" y="3218229"/>
             <a:ext cx="1365250" cy="539750"/>
           </a:xfrm>
           <a:prstGeom prst="flowChartAlternateProcess">
@@ -4343,7 +4346,7 @@
             <a:pPr algn="ctr"/>
             <a:r>
               <a:rPr lang="en-US" dirty="0" smtClean="0"/>
-              <a:t>Wait</a:t>
+              <a:t>Command</a:t>
             </a:r>
             <a:endParaRPr lang="en-US" dirty="0"/>
           </a:p>
@@ -4351,22 +4354,20 @@
       </p:sp>
       <p:cxnSp>
         <p:nvCxnSpPr>
-          <p:cNvPr id="39" name="Curved Connector 38"/>
+          <p:cNvPr id="31" name="Curved Connector 30"/>
           <p:cNvCxnSpPr>
-            <a:stCxn id="62" idx="3"/>
-            <a:endCxn id="21" idx="1"/>
+            <a:stCxn id="62" idx="1"/>
+            <a:endCxn id="21" idx="0"/>
           </p:cNvCxnSpPr>
           <p:nvPr/>
         </p:nvCxnSpPr>
         <p:spPr>
-          <a:xfrm>
-            <a:off x="3405518" y="2657764"/>
-            <a:ext cx="167416" cy="12700"/>
-          </a:xfrm>
-          <a:prstGeom prst="curvedConnector3">
-            <a:avLst>
-              <a:gd name="adj1" fmla="val 50000"/>
-            </a:avLst>
+          <a:xfrm rot="10800000" flipV="1">
+            <a:off x="2683700" y="2657763"/>
+            <a:ext cx="889235" cy="560465"/>
+          </a:xfrm>
+          <a:prstGeom prst="curvedConnector2">
+            <a:avLst/>
           </a:prstGeom>
           <a:ln>
             <a:tailEnd type="arrow"/>
@@ -4387,9 +4388,123 @@
           </a:fontRef>
         </p:style>
       </p:cxnSp>
+      <p:sp>
+        <p:nvSpPr>
+          <p:cNvPr id="12" name="Alternate Process 11"/>
+          <p:cNvSpPr/>
+          <p:nvPr/>
+        </p:nvSpPr>
+        <p:spPr>
+          <a:xfrm>
+            <a:off x="5132092" y="3218229"/>
+            <a:ext cx="1365250" cy="539750"/>
+          </a:xfrm>
+          <a:prstGeom prst="flowChartAlternateProcess">
+            <a:avLst/>
+          </a:prstGeom>
+        </p:spPr>
+        <p:style>
+          <a:lnRef idx="2">
+            <a:schemeClr val="dk1"/>
+          </a:lnRef>
+          <a:fillRef idx="1">
+            <a:schemeClr val="lt1"/>
+          </a:fillRef>
+          <a:effectRef idx="0">
+            <a:schemeClr val="dk1"/>
+          </a:effectRef>
+          <a:fontRef idx="minor">
+            <a:schemeClr val="dk1"/>
+          </a:fontRef>
+        </p:style>
+        <p:txBody>
+          <a:bodyPr rtlCol="0" anchor="ctr"/>
+          <a:lstStyle/>
+          <a:p>
+            <a:pPr algn="ctr"/>
+            <a:r>
+              <a:rPr lang="en-US" dirty="0" smtClean="0"/>
+              <a:t>Completion</a:t>
+            </a:r>
+            <a:endParaRPr lang="en-US" dirty="0"/>
+          </a:p>
+        </p:txBody>
+      </p:sp>
       <p:cxnSp>
         <p:nvCxnSpPr>
-          <p:cNvPr id="42" name="Curved Connector 41"/>
+          <p:cNvPr id="22" name="Curved Connector 21"/>
+          <p:cNvCxnSpPr>
+            <a:stCxn id="12" idx="0"/>
+            <a:endCxn id="62" idx="3"/>
+          </p:cNvCxnSpPr>
+          <p:nvPr/>
+        </p:nvCxnSpPr>
+        <p:spPr>
+          <a:xfrm rot="16200000" flipV="1">
+            <a:off x="5096219" y="2499730"/>
+            <a:ext cx="560465" cy="876533"/>
+          </a:xfrm>
+          <a:prstGeom prst="curvedConnector2">
+            <a:avLst/>
+          </a:prstGeom>
+          <a:ln>
+            <a:tailEnd type="arrow"/>
+          </a:ln>
+        </p:spPr>
+        <p:style>
+          <a:lnRef idx="2">
+            <a:schemeClr val="dk1"/>
+          </a:lnRef>
+          <a:fillRef idx="1">
+            <a:schemeClr val="lt1"/>
+          </a:fillRef>
+          <a:effectRef idx="0">
+            <a:schemeClr val="dk1"/>
+          </a:effectRef>
+          <a:fontRef idx="minor">
+            <a:schemeClr val="dk1"/>
+          </a:fontRef>
+        </p:style>
+      </p:cxnSp>
+      <p:cxnSp>
+        <p:nvCxnSpPr>
+          <p:cNvPr id="5" name="Straight Arrow Connector 4"/>
+          <p:cNvCxnSpPr>
+            <a:stCxn id="4" idx="2"/>
+            <a:endCxn id="62" idx="0"/>
+          </p:cNvCxnSpPr>
+          <p:nvPr/>
+        </p:nvCxnSpPr>
+        <p:spPr>
+          <a:xfrm>
+            <a:off x="4249208" y="2110316"/>
+            <a:ext cx="6351" cy="277573"/>
+          </a:xfrm>
+          <a:prstGeom prst="straightConnector1">
+            <a:avLst/>
+          </a:prstGeom>
+          <a:ln>
+            <a:tailEnd type="arrow"/>
+          </a:ln>
+        </p:spPr>
+        <p:style>
+          <a:lnRef idx="2">
+            <a:schemeClr val="dk1"/>
+          </a:lnRef>
+          <a:fillRef idx="1">
+            <a:schemeClr val="lt1"/>
+          </a:fillRef>
+          <a:effectRef idx="0">
+            <a:schemeClr val="dk1"/>
+          </a:effectRef>
+          <a:fontRef idx="minor">
+            <a:schemeClr val="dk1"/>
+          </a:fontRef>
+        </p:style>
+      </p:cxnSp>
+      <p:cxnSp>
+        <p:nvCxnSpPr>
+          <p:cNvPr id="8" name="Straight Arrow Connector 7"/>
           <p:cNvCxnSpPr>
             <a:stCxn id="21" idx="3"/>
             <a:endCxn id="7" idx="1"/>
@@ -4398,13 +4513,11 @@
         </p:nvCxnSpPr>
         <p:spPr>
           <a:xfrm>
-            <a:off x="4938184" y="2657764"/>
-            <a:ext cx="189312" cy="7029"/>
-          </a:xfrm>
-          <a:prstGeom prst="curvedConnector3">
-            <a:avLst>
-              <a:gd name="adj1" fmla="val 50000"/>
-            </a:avLst>
+            <a:off x="3366324" y="3488104"/>
+            <a:ext cx="443808" cy="0"/>
+          </a:xfrm>
+          <a:prstGeom prst="straightConnector1">
+            <a:avLst/>
           </a:prstGeom>
           <a:ln>
             <a:tailEnd type="arrow"/>
@@ -4427,19 +4540,19 @@
       </p:cxnSp>
       <p:cxnSp>
         <p:nvCxnSpPr>
-          <p:cNvPr id="45" name="Curved Connector 44"/>
+          <p:cNvPr id="13" name="Straight Arrow Connector 12"/>
           <p:cNvCxnSpPr>
-            <a:stCxn id="4" idx="1"/>
-            <a:endCxn id="62" idx="0"/>
+            <a:stCxn id="7" idx="3"/>
+            <a:endCxn id="12" idx="1"/>
           </p:cNvCxnSpPr>
           <p:nvPr/>
         </p:nvCxnSpPr>
         <p:spPr>
-          <a:xfrm rot="10800000" flipV="1">
-            <a:off x="2722893" y="1840441"/>
-            <a:ext cx="843690" cy="547448"/>
-          </a:xfrm>
-          <a:prstGeom prst="curvedConnector2">
+          <a:xfrm>
+            <a:off x="4688284" y="3488104"/>
+            <a:ext cx="443808" cy="0"/>
+          </a:xfrm>
+          <a:prstGeom prst="straightConnector1">
             <a:avLst/>
           </a:prstGeom>
           <a:ln>
@@ -4463,20 +4576,23 @@
       </p:cxnSp>
       <p:cxnSp>
         <p:nvCxnSpPr>
-          <p:cNvPr id="48" name="Curved Connector 47"/>
+          <p:cNvPr id="15" name="Curved Connector 14"/>
           <p:cNvCxnSpPr>
-            <a:stCxn id="7" idx="0"/>
-            <a:endCxn id="4" idx="3"/>
+            <a:stCxn id="7" idx="3"/>
+            <a:endCxn id="7" idx="2"/>
           </p:cNvCxnSpPr>
           <p:nvPr/>
         </p:nvCxnSpPr>
         <p:spPr>
-          <a:xfrm rot="16200000" flipV="1">
-            <a:off x="5093739" y="1678536"/>
-            <a:ext cx="554477" cy="878288"/>
-          </a:xfrm>
-          <a:prstGeom prst="curvedConnector2">
-            <a:avLst/>
+          <a:xfrm flipH="1">
+            <a:off x="4249208" y="3488104"/>
+            <a:ext cx="439076" cy="269875"/>
+          </a:xfrm>
+          <a:prstGeom prst="curvedConnector4">
+            <a:avLst>
+              <a:gd name="adj1" fmla="val -52064"/>
+              <a:gd name="adj2" fmla="val 184706"/>
+            </a:avLst>
           </a:prstGeom>
           <a:ln>
             <a:tailEnd type="arrow"/>
@@ -4500,13 +4616,20 @@
     </p:spTree>
     <p:extLst>
       <p:ext uri="{BB962C8B-B14F-4D97-AF65-F5344CB8AC3E}">
-        <p14:creationId xmlns:p14="http://schemas.microsoft.com/office/powerpoint/2010/main" val="3577890704"/>
+        <p14:creationId xmlns:p14="http://schemas.microsoft.com/office/powerpoint/2010/main" val="83182157"/>
       </p:ext>
     </p:extLst>
   </p:cSld>
   <p:clrMapOvr>
     <a:masterClrMapping/>
   </p:clrMapOvr>
+  <p:timing>
+    <p:tnLst>
+      <p:par>
+        <p:cTn id="1" dur="indefinite" restart="never" nodeType="tmRoot"/>
+      </p:par>
+    </p:tnLst>
+  </p:timing>
 </p:sld>
 </file>
 
@@ -4605,7 +4728,7 @@
             <a:pPr algn="ctr"/>
             <a:r>
               <a:rPr lang="en-US" dirty="0" smtClean="0"/>
-              <a:t>Initialize</a:t>
+              <a:t>Idle</a:t>
             </a:r>
             <a:endParaRPr lang="en-US" dirty="0"/>
           </a:p>
@@ -4619,8 +4742,8 @@
         </p:nvSpPr>
         <p:spPr>
           <a:xfrm>
-            <a:off x="3810132" y="3218229"/>
-            <a:ext cx="878152" cy="539750"/>
+            <a:off x="5127496" y="2394918"/>
+            <a:ext cx="1365250" cy="539750"/>
           </a:xfrm>
           <a:prstGeom prst="flowChartAlternateProcess">
             <a:avLst/>
@@ -4647,7 +4770,7 @@
             <a:pPr algn="ctr"/>
             <a:r>
               <a:rPr lang="en-US" dirty="0" smtClean="0"/>
-              <a:t>Poll</a:t>
+              <a:t>Read</a:t>
             </a:r>
             <a:endParaRPr lang="en-US" dirty="0"/>
           </a:p>
@@ -4697,7 +4820,7 @@
         </p:nvSpPr>
         <p:spPr>
           <a:xfrm>
-            <a:off x="3572934" y="2387889"/>
+            <a:off x="2040268" y="2387889"/>
             <a:ext cx="1365250" cy="539750"/>
           </a:xfrm>
           <a:prstGeom prst="flowChartAlternateProcess">
@@ -4725,7 +4848,7 @@
             <a:pPr algn="ctr"/>
             <a:r>
               <a:rPr lang="en-US" dirty="0" smtClean="0"/>
-              <a:t>Idle</a:t>
+              <a:t>Command</a:t>
             </a:r>
             <a:endParaRPr lang="en-US" dirty="0"/>
           </a:p>
@@ -4739,7 +4862,7 @@
         </p:nvSpPr>
         <p:spPr>
           <a:xfrm>
-            <a:off x="2001074" y="3218229"/>
+            <a:off x="3572934" y="2387889"/>
             <a:ext cx="1365250" cy="539750"/>
           </a:xfrm>
           <a:prstGeom prst="flowChartAlternateProcess">
@@ -4767,7 +4890,7 @@
             <a:pPr algn="ctr"/>
             <a:r>
               <a:rPr lang="en-US" dirty="0" smtClean="0"/>
-              <a:t>Command</a:t>
+              <a:t>Wait</a:t>
             </a:r>
             <a:endParaRPr lang="en-US" dirty="0"/>
           </a:p>
@@ -4775,53 +4898,17 @@
       </p:sp>
       <p:cxnSp>
         <p:nvCxnSpPr>
-          <p:cNvPr id="35" name="Curved Connector 34"/>
+          <p:cNvPr id="39" name="Curved Connector 38"/>
           <p:cNvCxnSpPr>
-            <a:stCxn id="4" idx="2"/>
-            <a:endCxn id="62" idx="0"/>
+            <a:stCxn id="62" idx="3"/>
+            <a:endCxn id="21" idx="1"/>
           </p:cNvCxnSpPr>
           <p:nvPr/>
         </p:nvCxnSpPr>
         <p:spPr>
-          <a:xfrm rot="16200000" flipH="1">
-            <a:off x="4113597" y="2245926"/>
-            <a:ext cx="277573" cy="6351"/>
-          </a:xfrm>
-          <a:prstGeom prst="curvedConnector3">
-            <a:avLst/>
-          </a:prstGeom>
-          <a:ln>
-            <a:tailEnd type="arrow"/>
-          </a:ln>
-        </p:spPr>
-        <p:style>
-          <a:lnRef idx="2">
-            <a:schemeClr val="dk1"/>
-          </a:lnRef>
-          <a:fillRef idx="1">
-            <a:schemeClr val="lt1"/>
-          </a:fillRef>
-          <a:effectRef idx="0">
-            <a:schemeClr val="dk1"/>
-          </a:effectRef>
-          <a:fontRef idx="minor">
-            <a:schemeClr val="dk1"/>
-          </a:fontRef>
-        </p:style>
-      </p:cxnSp>
-      <p:cxnSp>
-        <p:nvCxnSpPr>
-          <p:cNvPr id="67" name="Curved Connector 66"/>
-          <p:cNvCxnSpPr>
-            <a:stCxn id="21" idx="3"/>
-            <a:endCxn id="7" idx="1"/>
-          </p:cNvCxnSpPr>
-          <p:nvPr/>
-        </p:nvCxnSpPr>
-        <p:spPr>
-          <a:xfrm>
-            <a:off x="3366324" y="3488104"/>
-            <a:ext cx="443808" cy="12700"/>
+          <a:xfrm>
+            <a:off x="3405518" y="2657764"/>
+            <a:ext cx="167416" cy="12700"/>
           </a:xfrm>
           <a:prstGeom prst="curvedConnector3">
             <a:avLst>
@@ -4849,95 +4936,17 @@
       </p:cxnSp>
       <p:cxnSp>
         <p:nvCxnSpPr>
-          <p:cNvPr id="31" name="Curved Connector 30"/>
+          <p:cNvPr id="42" name="Curved Connector 41"/>
           <p:cNvCxnSpPr>
-            <a:stCxn id="62" idx="1"/>
-            <a:endCxn id="21" idx="0"/>
+            <a:stCxn id="21" idx="3"/>
+            <a:endCxn id="7" idx="1"/>
           </p:cNvCxnSpPr>
           <p:nvPr/>
         </p:nvCxnSpPr>
         <p:spPr>
-          <a:xfrm rot="10800000" flipV="1">
-            <a:off x="2683700" y="2657763"/>
-            <a:ext cx="889235" cy="560465"/>
-          </a:xfrm>
-          <a:prstGeom prst="curvedConnector2">
-            <a:avLst/>
-          </a:prstGeom>
-          <a:ln>
-            <a:tailEnd type="arrow"/>
-          </a:ln>
-        </p:spPr>
-        <p:style>
-          <a:lnRef idx="2">
-            <a:schemeClr val="dk1"/>
-          </a:lnRef>
-          <a:fillRef idx="1">
-            <a:schemeClr val="lt1"/>
-          </a:fillRef>
-          <a:effectRef idx="0">
-            <a:schemeClr val="dk1"/>
-          </a:effectRef>
-          <a:fontRef idx="minor">
-            <a:schemeClr val="dk1"/>
-          </a:fontRef>
-        </p:style>
-      </p:cxnSp>
-      <p:sp>
-        <p:nvSpPr>
-          <p:cNvPr id="12" name="Alternate Process 11"/>
-          <p:cNvSpPr/>
-          <p:nvPr/>
-        </p:nvSpPr>
-        <p:spPr>
-          <a:xfrm>
-            <a:off x="5132092" y="3218229"/>
-            <a:ext cx="1365250" cy="539750"/>
-          </a:xfrm>
-          <a:prstGeom prst="flowChartAlternateProcess">
-            <a:avLst/>
-          </a:prstGeom>
-        </p:spPr>
-        <p:style>
-          <a:lnRef idx="2">
-            <a:schemeClr val="dk1"/>
-          </a:lnRef>
-          <a:fillRef idx="1">
-            <a:schemeClr val="lt1"/>
-          </a:fillRef>
-          <a:effectRef idx="0">
-            <a:schemeClr val="dk1"/>
-          </a:effectRef>
-          <a:fontRef idx="minor">
-            <a:schemeClr val="dk1"/>
-          </a:fontRef>
-        </p:style>
-        <p:txBody>
-          <a:bodyPr rtlCol="0" anchor="ctr"/>
-          <a:lstStyle/>
-          <a:p>
-            <a:pPr algn="ctr"/>
-            <a:r>
-              <a:rPr lang="en-US" dirty="0" smtClean="0"/>
-              <a:t>Completion</a:t>
-            </a:r>
-            <a:endParaRPr lang="en-US" dirty="0"/>
-          </a:p>
-        </p:txBody>
-      </p:sp>
-      <p:cxnSp>
-        <p:nvCxnSpPr>
-          <p:cNvPr id="19" name="Curved Connector 18"/>
-          <p:cNvCxnSpPr>
-            <a:stCxn id="7" idx="3"/>
-            <a:endCxn id="12" idx="1"/>
-          </p:cNvCxnSpPr>
-          <p:nvPr/>
-        </p:nvCxnSpPr>
-        <p:spPr>
-          <a:xfrm>
-            <a:off x="4688284" y="3488104"/>
-            <a:ext cx="443808" cy="12700"/>
+          <a:xfrm>
+            <a:off x="4938184" y="2657764"/>
+            <a:ext cx="189312" cy="7029"/>
           </a:xfrm>
           <a:prstGeom prst="curvedConnector3">
             <a:avLst>
@@ -4965,17 +4974,17 @@
       </p:cxnSp>
       <p:cxnSp>
         <p:nvCxnSpPr>
-          <p:cNvPr id="22" name="Curved Connector 21"/>
+          <p:cNvPr id="45" name="Curved Connector 44"/>
           <p:cNvCxnSpPr>
-            <a:stCxn id="12" idx="0"/>
-            <a:endCxn id="62" idx="3"/>
+            <a:stCxn id="4" idx="1"/>
+            <a:endCxn id="62" idx="0"/>
           </p:cNvCxnSpPr>
           <p:nvPr/>
         </p:nvCxnSpPr>
         <p:spPr>
-          <a:xfrm rot="16200000" flipV="1">
-            <a:off x="5096219" y="2499730"/>
-            <a:ext cx="560465" cy="876533"/>
+          <a:xfrm rot="10800000" flipV="1">
+            <a:off x="2722893" y="1840441"/>
+            <a:ext cx="843690" cy="547448"/>
           </a:xfrm>
           <a:prstGeom prst="curvedConnector2">
             <a:avLst/>
@@ -4999,16 +5008,59 @@
           </a:fontRef>
         </p:style>
       </p:cxnSp>
+      <p:cxnSp>
+        <p:nvCxnSpPr>
+          <p:cNvPr id="48" name="Curved Connector 47"/>
+          <p:cNvCxnSpPr>
+            <a:stCxn id="7" idx="0"/>
+            <a:endCxn id="4" idx="3"/>
+          </p:cNvCxnSpPr>
+          <p:nvPr/>
+        </p:nvCxnSpPr>
+        <p:spPr>
+          <a:xfrm rot="16200000" flipV="1">
+            <a:off x="5093739" y="1678536"/>
+            <a:ext cx="554477" cy="878288"/>
+          </a:xfrm>
+          <a:prstGeom prst="curvedConnector2">
+            <a:avLst/>
+          </a:prstGeom>
+          <a:ln>
+            <a:tailEnd type="arrow"/>
+          </a:ln>
+        </p:spPr>
+        <p:style>
+          <a:lnRef idx="2">
+            <a:schemeClr val="dk1"/>
+          </a:lnRef>
+          <a:fillRef idx="1">
+            <a:schemeClr val="lt1"/>
+          </a:fillRef>
+          <a:effectRef idx="0">
+            <a:schemeClr val="dk1"/>
+          </a:effectRef>
+          <a:fontRef idx="minor">
+            <a:schemeClr val="dk1"/>
+          </a:fontRef>
+        </p:style>
+      </p:cxnSp>
     </p:spTree>
     <p:extLst>
       <p:ext uri="{BB962C8B-B14F-4D97-AF65-F5344CB8AC3E}">
-        <p14:creationId xmlns:p14="http://schemas.microsoft.com/office/powerpoint/2010/main" val="83182157"/>
+        <p14:creationId xmlns:p14="http://schemas.microsoft.com/office/powerpoint/2010/main" val="3577890704"/>
       </p:ext>
     </p:extLst>
   </p:cSld>
   <p:clrMapOvr>
     <a:masterClrMapping/>
   </p:clrMapOvr>
+  <p:timing>
+    <p:tnLst>
+      <p:par>
+        <p:cTn id="1" dur="indefinite" restart="never" nodeType="tmRoot"/>
+      </p:par>
+    </p:tnLst>
+  </p:timing>
 </p:sld>
 </file>
 

</xml_diff>